<commit_message>
updates to deck: intro
</commit_message>
<xml_diff>
--- a/Powerpoint Deck/React-State-Management.pptx
+++ b/Powerpoint Deck/React-State-Management.pptx
@@ -5,12 +5,13 @@
     <p:sldMasterId id="2147483648" r:id="rId1"/>
   </p:sldMasterIdLst>
   <p:notesMasterIdLst>
-    <p:notesMasterId r:id="rId5"/>
+    <p:notesMasterId r:id="rId6"/>
   </p:notesMasterIdLst>
   <p:sldIdLst>
     <p:sldId id="283" r:id="rId2"/>
     <p:sldId id="286" r:id="rId3"/>
-    <p:sldId id="256" r:id="rId4"/>
+    <p:sldId id="284" r:id="rId4"/>
+    <p:sldId id="256" r:id="rId5"/>
   </p:sldIdLst>
   <p:sldSz cx="12192000" cy="6858000"/>
   <p:notesSz cx="6858000" cy="9144000"/>
@@ -109,6 +110,11 @@
       </a:defRPr>
     </a:lvl9pPr>
   </p:defaultTextStyle>
+  <p:extLst>
+    <p:ext uri="{EFAFB233-063F-42B5-8137-9DF3F51BA10A}">
+      <p15:sldGuideLst xmlns:p15="http://schemas.microsoft.com/office/powerpoint/2012/main"/>
+    </p:ext>
+  </p:extLst>
 </p:presentation>
 </file>
 
@@ -194,7 +200,7 @@
           <a:p>
             <a:fld id="{C35AAE58-E562-DF47-A0F7-42787D754845}" type="datetimeFigureOut">
               <a:rPr lang="en-US" smtClean="0"/>
-              <a:t>3/21/23</a:t>
+              <a:t>3/22/2023</a:t>
             </a:fld>
             <a:endParaRPr lang="en-US"/>
           </a:p>
@@ -698,10 +704,18 @@
                 <a:effectLst/>
                 <a:latin typeface="Outfit"/>
               </a:rPr>
-              <a:t>-If you were to boil down an app to its two most fundamental components, what you'd get is UI and State. </a:t>
-            </a:r>
-          </a:p>
-          <a:p>
+              <a:t>UI and state are fundamental elements of any application, let’s think about this quote from </a:t>
+            </a:r>
+            <a:r>
+              <a:rPr lang="en-US" b="0" i="0" dirty="0" err="1">
+                <a:solidFill>
+                  <a:srgbClr val="F9F4DA"/>
+                </a:solidFill>
+                <a:effectLst/>
+                <a:latin typeface="Outfit"/>
+              </a:rPr>
+              <a:t>ui.dev</a:t>
+            </a:r>
             <a:endParaRPr lang="en-US" b="0" i="0" dirty="0">
               <a:solidFill>
                 <a:srgbClr val="F9F4DA"/>
@@ -711,6 +725,15 @@
             </a:endParaRPr>
           </a:p>
           <a:p>
+            <a:endParaRPr lang="en-US" b="0" i="0" dirty="0">
+              <a:solidFill>
+                <a:srgbClr val="F9F4DA"/>
+              </a:solidFill>
+              <a:effectLst/>
+              <a:latin typeface="Outfit"/>
+            </a:endParaRPr>
+          </a:p>
+          <a:p>
             <a:r>
               <a:rPr lang="en-US" b="0" i="0" dirty="0">
                 <a:solidFill>
@@ -719,7 +742,7 @@
                 <a:effectLst/>
                 <a:latin typeface="Outfit"/>
               </a:rPr>
-              <a:t>An app is composed primarily of UI and State.</a:t>
+              <a:t>“If you were to boil down an app to its two most fundamental components, what you'd get is UI and State.”</a:t>
             </a:r>
           </a:p>
           <a:p>
@@ -740,7 +763,7 @@
                 <a:effectLst/>
                 <a:latin typeface="Outfit"/>
               </a:rPr>
-              <a:t>- if you were to boil down the root cause for any bug you've ever written, odds are that bug was caused because of state mismanagement. </a:t>
+              <a:t>So, what that quote is saying is that, two core elements of any app are the UI you interact with, and the state changes that occur when you interact with that UI.</a:t>
             </a:r>
           </a:p>
           <a:p>
@@ -761,7 +784,7 @@
                 <a:effectLst/>
                 <a:latin typeface="Outfit"/>
               </a:rPr>
-              <a:t>The state the app expected and the state it got were out of sync. </a:t>
+              <a:t>If you think about the business rules in the app, again, it’s our state that changes in coordination with those rules.</a:t>
             </a:r>
           </a:p>
           <a:p>
@@ -782,7 +805,7 @@
                 <a:effectLst/>
                 <a:latin typeface="Outfit"/>
               </a:rPr>
-              <a:t>Have you ever thought about why the first rule of tech support is turning it off and back on again? It's because it resets the state and, therefore, fixes the problem.</a:t>
+              <a:t>So, an app is composed primarily of UI and State.</a:t>
             </a:r>
           </a:p>
           <a:p>
@@ -796,6 +819,93 @@
           </a:p>
           <a:p>
             <a:r>
+              <a:rPr lang="en-US" b="0" i="0" dirty="0">
+                <a:solidFill>
+                  <a:srgbClr val="F9F4DA"/>
+                </a:solidFill>
+                <a:effectLst/>
+                <a:latin typeface="Outfit"/>
+              </a:rPr>
+              <a:t>Now, here’s some more on the quote from above:</a:t>
+            </a:r>
+          </a:p>
+          <a:p>
+            <a:r>
+              <a:rPr lang="en-US" b="0" i="0" dirty="0">
+                <a:solidFill>
+                  <a:srgbClr val="F9F4DA"/>
+                </a:solidFill>
+                <a:effectLst/>
+                <a:latin typeface="Outfit"/>
+              </a:rPr>
+              <a:t>“if you were to boil down the root cause for any bug you've ever written, odds are that bug was caused because of state mismanagement. The state the app expected and the state it got were out of sync.</a:t>
+            </a:r>
+          </a:p>
+          <a:p>
+            <a:r>
+              <a:rPr lang="en-US" b="0" i="0" dirty="0">
+                <a:solidFill>
+                  <a:srgbClr val="F9F4DA"/>
+                </a:solidFill>
+                <a:effectLst/>
+                <a:latin typeface="Outfit"/>
+              </a:rPr>
+              <a:t>Have you ever thought about why the first rule of tech support is turning it off and back on again? It's because it resets the state and, therefore, fixes the problem.”</a:t>
+            </a:r>
+          </a:p>
+          <a:p>
+            <a:endParaRPr lang="en-US" b="0" i="0" dirty="0">
+              <a:solidFill>
+                <a:srgbClr val="F9F4DA"/>
+              </a:solidFill>
+              <a:effectLst/>
+              <a:latin typeface="Outfit"/>
+            </a:endParaRPr>
+          </a:p>
+          <a:p>
+            <a:r>
+              <a:rPr lang="en-US" b="0" i="0" dirty="0">
+                <a:solidFill>
+                  <a:srgbClr val="F9F4DA"/>
+                </a:solidFill>
+                <a:effectLst/>
+                <a:latin typeface="Outfit"/>
+              </a:rPr>
+              <a:t>So, by increasing the predictability of your state, you decrease the amount of bugs in your application.</a:t>
+            </a:r>
+          </a:p>
+          <a:p>
+            <a:endParaRPr lang="en-US" b="0" i="0" dirty="0">
+              <a:solidFill>
+                <a:srgbClr val="F9F4DA"/>
+              </a:solidFill>
+              <a:effectLst/>
+              <a:latin typeface="Outfit"/>
+            </a:endParaRPr>
+          </a:p>
+          <a:p>
+            <a:r>
+              <a:rPr lang="en-US" b="0" i="0" dirty="0">
+                <a:solidFill>
+                  <a:srgbClr val="F9F4DA"/>
+                </a:solidFill>
+                <a:effectLst/>
+                <a:latin typeface="Outfit"/>
+              </a:rPr>
+              <a:t>And that’s why state management is important.</a:t>
+            </a:r>
+          </a:p>
+          <a:p>
+            <a:endParaRPr lang="en-US" b="0" i="0" dirty="0">
+              <a:solidFill>
+                <a:srgbClr val="F9F4DA"/>
+              </a:solidFill>
+              <a:effectLst/>
+              <a:latin typeface="Outfit"/>
+            </a:endParaRPr>
+          </a:p>
+          <a:p>
+            <a:r>
               <a:rPr lang="en-US" dirty="0">
                 <a:hlinkClick r:id="rId3"/>
               </a:rPr>
@@ -832,6 +942,200 @@
     <p:extLst>
       <p:ext uri="{BB962C8B-B14F-4D97-AF65-F5344CB8AC3E}">
         <p14:creationId xmlns:p14="http://schemas.microsoft.com/office/powerpoint/2010/main" val="3191767074"/>
+      </p:ext>
+    </p:extLst>
+  </p:cSld>
+  <p:clrMapOvr>
+    <a:masterClrMapping/>
+  </p:clrMapOvr>
+</p:notes>
+</file>
+
+<file path=ppt/notesSlides/notesSlide3.xml><?xml version="1.0" encoding="utf-8"?>
+<p:notes xmlns:a="http://schemas.openxmlformats.org/drawingml/2006/main" xmlns:r="http://schemas.openxmlformats.org/officeDocument/2006/relationships" xmlns:p="http://schemas.openxmlformats.org/presentationml/2006/main">
+  <p:cSld>
+    <p:spTree>
+      <p:nvGrpSpPr>
+        <p:cNvPr id="1" name=""/>
+        <p:cNvGrpSpPr/>
+        <p:nvPr/>
+      </p:nvGrpSpPr>
+      <p:grpSpPr>
+        <a:xfrm>
+          <a:off x="0" y="0"/>
+          <a:ext cx="0" cy="0"/>
+          <a:chOff x="0" y="0"/>
+          <a:chExt cx="0" cy="0"/>
+        </a:xfrm>
+      </p:grpSpPr>
+      <p:sp>
+        <p:nvSpPr>
+          <p:cNvPr id="2" name="Slide Image Placeholder 1"/>
+          <p:cNvSpPr>
+            <a:spLocks noGrp="1" noRot="1" noChangeAspect="1"/>
+          </p:cNvSpPr>
+          <p:nvPr>
+            <p:ph type="sldImg"/>
+          </p:nvPr>
+        </p:nvSpPr>
+        <p:spPr/>
+      </p:sp>
+      <p:sp>
+        <p:nvSpPr>
+          <p:cNvPr id="3" name="Notes Placeholder 2"/>
+          <p:cNvSpPr>
+            <a:spLocks noGrp="1"/>
+          </p:cNvSpPr>
+          <p:nvPr>
+            <p:ph type="body" idx="1"/>
+          </p:nvPr>
+        </p:nvSpPr>
+        <p:spPr/>
+        <p:txBody>
+          <a:bodyPr/>
+          <a:lstStyle/>
+          <a:p>
+            <a:pPr marL="0" marR="0" lvl="0" indent="0" algn="l" defTabSz="914400" rtl="0" eaLnBrk="1" fontAlgn="auto" latinLnBrk="0" hangingPunct="1">
+              <a:lnSpc>
+                <a:spcPct val="100000"/>
+              </a:lnSpc>
+              <a:spcBef>
+                <a:spcPts val="0"/>
+              </a:spcBef>
+              <a:spcAft>
+                <a:spcPts val="0"/>
+              </a:spcAft>
+              <a:buClrTx/>
+              <a:buSzTx/>
+              <a:buFontTx/>
+              <a:buNone/>
+              <a:tabLst/>
+              <a:defRPr/>
+            </a:pPr>
+            <a:r>
+              <a:rPr lang="en-US" dirty="0"/>
+              <a:t>Now that we understand why state management is important, let’s look at the state management tools we’re given out of the box with React</a:t>
+            </a:r>
+          </a:p>
+          <a:p>
+            <a:endParaRPr lang="en-US" dirty="0"/>
+          </a:p>
+        </p:txBody>
+      </p:sp>
+      <p:sp>
+        <p:nvSpPr>
+          <p:cNvPr id="4" name="Slide Number Placeholder 3"/>
+          <p:cNvSpPr>
+            <a:spLocks noGrp="1"/>
+          </p:cNvSpPr>
+          <p:nvPr>
+            <p:ph type="sldNum" sz="quarter" idx="5"/>
+          </p:nvPr>
+        </p:nvSpPr>
+        <p:spPr/>
+        <p:txBody>
+          <a:bodyPr/>
+          <a:lstStyle/>
+          <a:p>
+            <a:fld id="{93AF359F-E95C-F64B-B302-8F3904292CB4}" type="slidenum">
+              <a:rPr lang="en-US" smtClean="0"/>
+              <a:t>3</a:t>
+            </a:fld>
+            <a:endParaRPr lang="en-US"/>
+          </a:p>
+        </p:txBody>
+      </p:sp>
+    </p:spTree>
+    <p:extLst>
+      <p:ext uri="{BB962C8B-B14F-4D97-AF65-F5344CB8AC3E}">
+        <p14:creationId xmlns:p14="http://schemas.microsoft.com/office/powerpoint/2010/main" val="1505413360"/>
+      </p:ext>
+    </p:extLst>
+  </p:cSld>
+  <p:clrMapOvr>
+    <a:masterClrMapping/>
+  </p:clrMapOvr>
+</p:notes>
+</file>
+
+<file path=ppt/notesSlides/notesSlide4.xml><?xml version="1.0" encoding="utf-8"?>
+<p:notes xmlns:a="http://schemas.openxmlformats.org/drawingml/2006/main" xmlns:r="http://schemas.openxmlformats.org/officeDocument/2006/relationships" xmlns:p="http://schemas.openxmlformats.org/presentationml/2006/main">
+  <p:cSld>
+    <p:spTree>
+      <p:nvGrpSpPr>
+        <p:cNvPr id="1" name=""/>
+        <p:cNvGrpSpPr/>
+        <p:nvPr/>
+      </p:nvGrpSpPr>
+      <p:grpSpPr>
+        <a:xfrm>
+          <a:off x="0" y="0"/>
+          <a:ext cx="0" cy="0"/>
+          <a:chOff x="0" y="0"/>
+          <a:chExt cx="0" cy="0"/>
+        </a:xfrm>
+      </p:grpSpPr>
+      <p:sp>
+        <p:nvSpPr>
+          <p:cNvPr id="2" name="Slide Image Placeholder 1"/>
+          <p:cNvSpPr>
+            <a:spLocks noGrp="1" noRot="1" noChangeAspect="1"/>
+          </p:cNvSpPr>
+          <p:nvPr>
+            <p:ph type="sldImg"/>
+          </p:nvPr>
+        </p:nvSpPr>
+        <p:spPr/>
+      </p:sp>
+      <p:sp>
+        <p:nvSpPr>
+          <p:cNvPr id="3" name="Notes Placeholder 2"/>
+          <p:cNvSpPr>
+            <a:spLocks noGrp="1"/>
+          </p:cNvSpPr>
+          <p:nvPr>
+            <p:ph type="body" idx="1"/>
+          </p:nvPr>
+        </p:nvSpPr>
+        <p:spPr/>
+        <p:txBody>
+          <a:bodyPr/>
+          <a:lstStyle/>
+          <a:p>
+            <a:r>
+              <a:rPr lang="en-US" dirty="0"/>
+              <a:t>Now that we understand why state management is important, let’s look at the state management tools we’re given out of the box with React</a:t>
+            </a:r>
+          </a:p>
+        </p:txBody>
+      </p:sp>
+      <p:sp>
+        <p:nvSpPr>
+          <p:cNvPr id="4" name="Slide Number Placeholder 3"/>
+          <p:cNvSpPr>
+            <a:spLocks noGrp="1"/>
+          </p:cNvSpPr>
+          <p:nvPr>
+            <p:ph type="sldNum" sz="quarter" idx="5"/>
+          </p:nvPr>
+        </p:nvSpPr>
+        <p:spPr/>
+        <p:txBody>
+          <a:bodyPr/>
+          <a:lstStyle/>
+          <a:p>
+            <a:fld id="{93AF359F-E95C-F64B-B302-8F3904292CB4}" type="slidenum">
+              <a:rPr lang="en-US" smtClean="0"/>
+              <a:t>4</a:t>
+            </a:fld>
+            <a:endParaRPr lang="en-US"/>
+          </a:p>
+        </p:txBody>
+      </p:sp>
+    </p:spTree>
+    <p:extLst>
+      <p:ext uri="{BB962C8B-B14F-4D97-AF65-F5344CB8AC3E}">
+        <p14:creationId xmlns:p14="http://schemas.microsoft.com/office/powerpoint/2010/main" val="2470815764"/>
       </p:ext>
     </p:extLst>
   </p:cSld>
@@ -988,7 +1292,7 @@
           <a:p>
             <a:fld id="{925B7355-5112-4546-A5E8-03B2C9A2AF27}" type="datetimeFigureOut">
               <a:rPr lang="en-US" smtClean="0"/>
-              <a:t>3/21/23</a:t>
+              <a:t>3/22/2023</a:t>
             </a:fld>
             <a:endParaRPr lang="en-US"/>
           </a:p>
@@ -1186,7 +1490,7 @@
           <a:p>
             <a:fld id="{925B7355-5112-4546-A5E8-03B2C9A2AF27}" type="datetimeFigureOut">
               <a:rPr lang="en-US" smtClean="0"/>
-              <a:t>3/21/23</a:t>
+              <a:t>3/22/2023</a:t>
             </a:fld>
             <a:endParaRPr lang="en-US"/>
           </a:p>
@@ -1394,7 +1698,7 @@
           <a:p>
             <a:fld id="{925B7355-5112-4546-A5E8-03B2C9A2AF27}" type="datetimeFigureOut">
               <a:rPr lang="en-US" smtClean="0"/>
-              <a:t>3/21/23</a:t>
+              <a:t>3/22/2023</a:t>
             </a:fld>
             <a:endParaRPr lang="en-US"/>
           </a:p>
@@ -1686,7 +1990,7 @@
             <a:fld id="{6F202981-861B-764C-8A12-BA3162DB706A}" type="datetimeFigureOut">
               <a:rPr lang="en-US" smtClean="0"/>
               <a:pPr/>
-              <a:t>3/21/23</a:t>
+              <a:t>3/22/2023</a:t>
             </a:fld>
             <a:endParaRPr lang="en-US"/>
           </a:p>
@@ -1817,7 +2121,7 @@
             <a:fld id="{6F202981-861B-764C-8A12-BA3162DB706A}" type="datetimeFigureOut">
               <a:rPr lang="en-US" smtClean="0"/>
               <a:pPr/>
-              <a:t>3/21/23</a:t>
+              <a:t>3/22/2023</a:t>
             </a:fld>
             <a:endParaRPr lang="en-US"/>
           </a:p>
@@ -2015,6 +2319,262 @@
     <p:extLst>
       <p:ext uri="{BB962C8B-B14F-4D97-AF65-F5344CB8AC3E}">
         <p14:creationId xmlns:p14="http://schemas.microsoft.com/office/powerpoint/2010/main" val="3273170674"/>
+      </p:ext>
+    </p:extLst>
+  </p:cSld>
+  <p:clrMapOvr>
+    <a:masterClrMapping/>
+  </p:clrMapOvr>
+</p:sldLayout>
+</file>
+
+<file path=ppt/slideLayouts/slideLayout14.xml><?xml version="1.0" encoding="utf-8"?>
+<p:sldLayout xmlns:a="http://schemas.openxmlformats.org/drawingml/2006/main" xmlns:r="http://schemas.openxmlformats.org/officeDocument/2006/relationships" xmlns:p="http://schemas.openxmlformats.org/presentationml/2006/main" userDrawn="1">
+  <p:cSld name="Chapter Title">
+    <p:bg>
+      <p:bgPr>
+        <a:solidFill>
+          <a:srgbClr val="552061"/>
+        </a:solidFill>
+        <a:effectLst/>
+      </p:bgPr>
+    </p:bg>
+    <p:spTree>
+      <p:nvGrpSpPr>
+        <p:cNvPr id="1" name=""/>
+        <p:cNvGrpSpPr/>
+        <p:nvPr/>
+      </p:nvGrpSpPr>
+      <p:grpSpPr>
+        <a:xfrm>
+          <a:off x="0" y="0"/>
+          <a:ext cx="0" cy="0"/>
+          <a:chOff x="0" y="0"/>
+          <a:chExt cx="0" cy="0"/>
+        </a:xfrm>
+      </p:grpSpPr>
+      <p:sp>
+        <p:nvSpPr>
+          <p:cNvPr id="3" name="Date Placeholder 2">
+            <a:extLst>
+              <a:ext uri="{FF2B5EF4-FFF2-40B4-BE49-F238E27FC236}">
+                <a16:creationId xmlns:a16="http://schemas.microsoft.com/office/drawing/2014/main" id="{9695D056-E7F4-D5D4-4D29-31D5417DB92F}"/>
+              </a:ext>
+            </a:extLst>
+          </p:cNvPr>
+          <p:cNvSpPr>
+            <a:spLocks noGrp="1"/>
+          </p:cNvSpPr>
+          <p:nvPr>
+            <p:ph type="dt" sz="half" idx="10"/>
+          </p:nvPr>
+        </p:nvSpPr>
+        <p:spPr/>
+        <p:txBody>
+          <a:bodyPr/>
+          <a:lstStyle/>
+          <a:p>
+            <a:fld id="{6F202981-861B-764C-8A12-BA3162DB706A}" type="datetimeFigureOut">
+              <a:rPr lang="en-US" smtClean="0"/>
+              <a:pPr/>
+              <a:t>3/22/2023</a:t>
+            </a:fld>
+            <a:endParaRPr lang="en-US"/>
+          </a:p>
+        </p:txBody>
+      </p:sp>
+      <p:sp>
+        <p:nvSpPr>
+          <p:cNvPr id="4" name="Footer Placeholder 3">
+            <a:extLst>
+              <a:ext uri="{FF2B5EF4-FFF2-40B4-BE49-F238E27FC236}">
+                <a16:creationId xmlns:a16="http://schemas.microsoft.com/office/drawing/2014/main" id="{3D483FA9-A109-E53C-2C26-2F8B4F4FBBE9}"/>
+              </a:ext>
+            </a:extLst>
+          </p:cNvPr>
+          <p:cNvSpPr>
+            <a:spLocks noGrp="1"/>
+          </p:cNvSpPr>
+          <p:nvPr>
+            <p:ph type="ftr" sz="quarter" idx="11"/>
+          </p:nvPr>
+        </p:nvSpPr>
+        <p:spPr>
+          <a:xfrm>
+            <a:off x="4038600" y="6356350"/>
+            <a:ext cx="4114800" cy="365125"/>
+          </a:xfrm>
+          <a:prstGeom prst="rect">
+            <a:avLst/>
+          </a:prstGeom>
+        </p:spPr>
+        <p:txBody>
+          <a:bodyPr/>
+          <a:lstStyle/>
+          <a:p>
+            <a:endParaRPr lang="en-US"/>
+          </a:p>
+        </p:txBody>
+      </p:sp>
+      <p:sp>
+        <p:nvSpPr>
+          <p:cNvPr id="5" name="Slide Number Placeholder 4">
+            <a:extLst>
+              <a:ext uri="{FF2B5EF4-FFF2-40B4-BE49-F238E27FC236}">
+                <a16:creationId xmlns:a16="http://schemas.microsoft.com/office/drawing/2014/main" id="{62961FBC-0AC5-AEAA-9F88-A94A014AAB84}"/>
+              </a:ext>
+            </a:extLst>
+          </p:cNvPr>
+          <p:cNvSpPr>
+            <a:spLocks noGrp="1"/>
+          </p:cNvSpPr>
+          <p:nvPr>
+            <p:ph type="sldNum" sz="quarter" idx="12"/>
+          </p:nvPr>
+        </p:nvSpPr>
+        <p:spPr/>
+        <p:txBody>
+          <a:bodyPr/>
+          <a:lstStyle/>
+          <a:p>
+            <a:fld id="{566A63C5-CCCE-DA47-8C12-F99EBD9F7C78}" type="slidenum">
+              <a:rPr lang="en-US" smtClean="0"/>
+              <a:pPr/>
+              <a:t>‹#›</a:t>
+            </a:fld>
+            <a:endParaRPr lang="en-US"/>
+          </a:p>
+        </p:txBody>
+      </p:sp>
+      <p:sp>
+        <p:nvSpPr>
+          <p:cNvPr id="9" name="Title 1">
+            <a:extLst>
+              <a:ext uri="{FF2B5EF4-FFF2-40B4-BE49-F238E27FC236}">
+                <a16:creationId xmlns:a16="http://schemas.microsoft.com/office/drawing/2014/main" id="{BF4AEA55-AF95-18FE-1F06-FA659D819A74}"/>
+              </a:ext>
+            </a:extLst>
+          </p:cNvPr>
+          <p:cNvSpPr>
+            <a:spLocks noGrp="1"/>
+          </p:cNvSpPr>
+          <p:nvPr>
+            <p:ph type="title" hasCustomPrompt="1"/>
+          </p:nvPr>
+        </p:nvSpPr>
+        <p:spPr>
+          <a:xfrm>
+            <a:off x="831850" y="2471532"/>
+            <a:ext cx="9183007" cy="2120900"/>
+          </a:xfrm>
+          <a:noFill/>
+        </p:spPr>
+        <p:txBody>
+          <a:bodyPr anchor="t" anchorCtr="0">
+            <a:normAutofit/>
+          </a:bodyPr>
+          <a:lstStyle>
+            <a:lvl1pPr>
+              <a:defRPr sz="7200" b="1" spc="-150">
+                <a:solidFill>
+                  <a:schemeClr val="bg1"/>
+                </a:solidFill>
+                <a:latin typeface="Helvetica" pitchFamily="2" charset="0"/>
+              </a:defRPr>
+            </a:lvl1pPr>
+          </a:lstStyle>
+          <a:p>
+            <a:r>
+              <a:rPr lang="en-US" dirty="0"/>
+              <a:t>Title Here</a:t>
+            </a:r>
+          </a:p>
+        </p:txBody>
+      </p:sp>
+      <p:sp>
+        <p:nvSpPr>
+          <p:cNvPr id="11" name="Text Placeholder 3">
+            <a:extLst>
+              <a:ext uri="{FF2B5EF4-FFF2-40B4-BE49-F238E27FC236}">
+                <a16:creationId xmlns:a16="http://schemas.microsoft.com/office/drawing/2014/main" id="{CBFB946C-9D69-EAE0-C618-BCCBE8BBB2EF}"/>
+              </a:ext>
+            </a:extLst>
+          </p:cNvPr>
+          <p:cNvSpPr>
+            <a:spLocks noGrp="1"/>
+          </p:cNvSpPr>
+          <p:nvPr>
+            <p:ph type="body" sz="half" idx="14" hasCustomPrompt="1"/>
+          </p:nvPr>
+        </p:nvSpPr>
+        <p:spPr>
+          <a:xfrm>
+            <a:off x="838336" y="2163126"/>
+            <a:ext cx="9183007" cy="287323"/>
+          </a:xfrm>
+        </p:spPr>
+        <p:txBody>
+          <a:bodyPr>
+            <a:noAutofit/>
+          </a:bodyPr>
+          <a:lstStyle>
+            <a:lvl1pPr marL="0" indent="0">
+              <a:buNone/>
+              <a:defRPr sz="1800" spc="300">
+                <a:solidFill>
+                  <a:schemeClr val="bg1">
+                    <a:alpha val="50000"/>
+                  </a:schemeClr>
+                </a:solidFill>
+                <a:latin typeface="Helvetica" pitchFamily="2" charset="0"/>
+              </a:defRPr>
+            </a:lvl1pPr>
+            <a:lvl2pPr marL="457200" indent="0">
+              <a:buNone/>
+              <a:defRPr sz="1400"/>
+            </a:lvl2pPr>
+            <a:lvl3pPr marL="914400" indent="0">
+              <a:buNone/>
+              <a:defRPr sz="1200"/>
+            </a:lvl3pPr>
+            <a:lvl4pPr marL="1371600" indent="0">
+              <a:buNone/>
+              <a:defRPr sz="1000"/>
+            </a:lvl4pPr>
+            <a:lvl5pPr marL="1828800" indent="0">
+              <a:buNone/>
+              <a:defRPr sz="1000"/>
+            </a:lvl5pPr>
+            <a:lvl6pPr marL="2286000" indent="0">
+              <a:buNone/>
+              <a:defRPr sz="1000"/>
+            </a:lvl6pPr>
+            <a:lvl7pPr marL="2743200" indent="0">
+              <a:buNone/>
+              <a:defRPr sz="1000"/>
+            </a:lvl7pPr>
+            <a:lvl8pPr marL="3200400" indent="0">
+              <a:buNone/>
+              <a:defRPr sz="1000"/>
+            </a:lvl8pPr>
+            <a:lvl9pPr marL="3657600" indent="0">
+              <a:buNone/>
+              <a:defRPr sz="1000"/>
+            </a:lvl9pPr>
+          </a:lstStyle>
+          <a:p>
+            <a:pPr lvl="0"/>
+            <a:r>
+              <a:rPr lang="en-US" dirty="0"/>
+              <a:t>SUBHEADER – ALL CAPS</a:t>
+            </a:r>
+          </a:p>
+        </p:txBody>
+      </p:sp>
+    </p:spTree>
+    <p:extLst>
+      <p:ext uri="{BB962C8B-B14F-4D97-AF65-F5344CB8AC3E}">
+        <p14:creationId xmlns:p14="http://schemas.microsoft.com/office/powerpoint/2010/main" val="2437862934"/>
       </p:ext>
     </p:extLst>
   </p:cSld>
@@ -2149,7 +2709,7 @@
           <a:p>
             <a:fld id="{925B7355-5112-4546-A5E8-03B2C9A2AF27}" type="datetimeFigureOut">
               <a:rPr lang="en-US" smtClean="0"/>
-              <a:t>3/21/23</a:t>
+              <a:t>3/22/2023</a:t>
             </a:fld>
             <a:endParaRPr lang="en-US"/>
           </a:p>
@@ -2424,7 +2984,7 @@
           <a:p>
             <a:fld id="{925B7355-5112-4546-A5E8-03B2C9A2AF27}" type="datetimeFigureOut">
               <a:rPr lang="en-US" smtClean="0"/>
-              <a:t>3/21/23</a:t>
+              <a:t>3/22/2023</a:t>
             </a:fld>
             <a:endParaRPr lang="en-US"/>
           </a:p>
@@ -2689,7 +3249,7 @@
           <a:p>
             <a:fld id="{925B7355-5112-4546-A5E8-03B2C9A2AF27}" type="datetimeFigureOut">
               <a:rPr lang="en-US" smtClean="0"/>
-              <a:t>3/21/23</a:t>
+              <a:t>3/22/2023</a:t>
             </a:fld>
             <a:endParaRPr lang="en-US"/>
           </a:p>
@@ -3101,7 +3661,7 @@
           <a:p>
             <a:fld id="{925B7355-5112-4546-A5E8-03B2C9A2AF27}" type="datetimeFigureOut">
               <a:rPr lang="en-US" smtClean="0"/>
-              <a:t>3/21/23</a:t>
+              <a:t>3/22/2023</a:t>
             </a:fld>
             <a:endParaRPr lang="en-US"/>
           </a:p>
@@ -3242,7 +3802,7 @@
           <a:p>
             <a:fld id="{925B7355-5112-4546-A5E8-03B2C9A2AF27}" type="datetimeFigureOut">
               <a:rPr lang="en-US" smtClean="0"/>
-              <a:t>3/21/23</a:t>
+              <a:t>3/22/2023</a:t>
             </a:fld>
             <a:endParaRPr lang="en-US"/>
           </a:p>
@@ -3355,7 +3915,7 @@
           <a:p>
             <a:fld id="{925B7355-5112-4546-A5E8-03B2C9A2AF27}" type="datetimeFigureOut">
               <a:rPr lang="en-US" smtClean="0"/>
-              <a:t>3/21/23</a:t>
+              <a:t>3/22/2023</a:t>
             </a:fld>
             <a:endParaRPr lang="en-US"/>
           </a:p>
@@ -3666,7 +4226,7 @@
           <a:p>
             <a:fld id="{925B7355-5112-4546-A5E8-03B2C9A2AF27}" type="datetimeFigureOut">
               <a:rPr lang="en-US" smtClean="0"/>
-              <a:t>3/21/23</a:t>
+              <a:t>3/22/2023</a:t>
             </a:fld>
             <a:endParaRPr lang="en-US"/>
           </a:p>
@@ -3954,7 +4514,7 @@
           <a:p>
             <a:fld id="{925B7355-5112-4546-A5E8-03B2C9A2AF27}" type="datetimeFigureOut">
               <a:rPr lang="en-US" smtClean="0"/>
-              <a:t>3/21/23</a:t>
+              <a:t>3/22/2023</a:t>
             </a:fld>
             <a:endParaRPr lang="en-US"/>
           </a:p>
@@ -4195,7 +4755,7 @@
           <a:p>
             <a:fld id="{925B7355-5112-4546-A5E8-03B2C9A2AF27}" type="datetimeFigureOut">
               <a:rPr lang="en-US" smtClean="0"/>
-              <a:t>3/21/23</a:t>
+              <a:t>3/22/2023</a:t>
             </a:fld>
             <a:endParaRPr lang="en-US"/>
           </a:p>
@@ -4313,6 +4873,7 @@
     <p:sldLayoutId id="2147483659" r:id="rId11"/>
     <p:sldLayoutId id="2147483660" r:id="rId12"/>
     <p:sldLayoutId id="2147483662" r:id="rId13"/>
+    <p:sldLayoutId id="2147483663" r:id="rId14"/>
   </p:sldLayoutIdLst>
   <p:txStyles>
     <p:titleStyle>
@@ -4661,7 +5222,7 @@
         <p:spPr/>
         <p:txBody>
           <a:bodyPr>
-            <a:normAutofit fontScale="92500" lnSpcReduction="20000"/>
+            <a:normAutofit fontScale="92500" lnSpcReduction="10000"/>
           </a:bodyPr>
           <a:lstStyle/>
           <a:p>
@@ -4755,7 +5316,7 @@
           <a:p>
             <a:r>
               <a:rPr lang="en-US" dirty="0"/>
-              <a:t>UI and State are fundamental elements of an application</a:t>
+              <a:t>UI and State are fundamental elements of any application</a:t>
             </a:r>
           </a:p>
         </p:txBody>
@@ -4774,6 +5335,66 @@
 </file>
 
 <file path=ppt/slides/slide3.xml><?xml version="1.0" encoding="utf-8"?>
+<p:sld xmlns:a="http://schemas.openxmlformats.org/drawingml/2006/main" xmlns:r="http://schemas.openxmlformats.org/officeDocument/2006/relationships" xmlns:p="http://schemas.openxmlformats.org/presentationml/2006/main">
+  <p:cSld>
+    <p:spTree>
+      <p:nvGrpSpPr>
+        <p:cNvPr id="1" name=""/>
+        <p:cNvGrpSpPr/>
+        <p:nvPr/>
+      </p:nvGrpSpPr>
+      <p:grpSpPr>
+        <a:xfrm>
+          <a:off x="0" y="0"/>
+          <a:ext cx="0" cy="0"/>
+          <a:chOff x="0" y="0"/>
+          <a:chExt cx="0" cy="0"/>
+        </a:xfrm>
+      </p:grpSpPr>
+      <p:sp>
+        <p:nvSpPr>
+          <p:cNvPr id="2" name="Title 1">
+            <a:extLst>
+              <a:ext uri="{FF2B5EF4-FFF2-40B4-BE49-F238E27FC236}">
+                <a16:creationId xmlns:a16="http://schemas.microsoft.com/office/drawing/2014/main" id="{02E5982F-2BFC-48AB-14FB-760308D9909F}"/>
+              </a:ext>
+            </a:extLst>
+          </p:cNvPr>
+          <p:cNvSpPr>
+            <a:spLocks noGrp="1"/>
+          </p:cNvSpPr>
+          <p:nvPr>
+            <p:ph type="title"/>
+          </p:nvPr>
+        </p:nvSpPr>
+        <p:spPr/>
+        <p:txBody>
+          <a:bodyPr>
+            <a:normAutofit fontScale="90000"/>
+          </a:bodyPr>
+          <a:lstStyle/>
+          <a:p>
+            <a:r>
+              <a:rPr lang="en-US" dirty="0"/>
+              <a:t>Built-In State Management in React</a:t>
+            </a:r>
+          </a:p>
+        </p:txBody>
+      </p:sp>
+    </p:spTree>
+    <p:extLst>
+      <p:ext uri="{BB962C8B-B14F-4D97-AF65-F5344CB8AC3E}">
+        <p14:creationId xmlns:p14="http://schemas.microsoft.com/office/powerpoint/2010/main" val="3432206875"/>
+      </p:ext>
+    </p:extLst>
+  </p:cSld>
+  <p:clrMapOvr>
+    <a:masterClrMapping/>
+  </p:clrMapOvr>
+</p:sld>
+</file>
+
+<file path=ppt/slides/slide4.xml><?xml version="1.0" encoding="utf-8"?>
 <p:sld xmlns:a="http://schemas.openxmlformats.org/drawingml/2006/main" xmlns:r="http://schemas.openxmlformats.org/officeDocument/2006/relationships" xmlns:p="http://schemas.openxmlformats.org/presentationml/2006/main">
   <p:cSld>
     <p:spTree>

</xml_diff>